<commit_message>
code fixes, doc ppt half done
</commit_message>
<xml_diff>
--- a/Documentation/DocumentationPresentation.pptx
+++ b/Documentation/DocumentationPresentation.pptx
@@ -9,6 +9,13 @@
     <p:sldId id="257" r:id="rId3"/>
     <p:sldId id="258" r:id="rId4"/>
     <p:sldId id="259" r:id="rId5"/>
+    <p:sldId id="260" r:id="rId6"/>
+    <p:sldId id="261" r:id="rId7"/>
+    <p:sldId id="262" r:id="rId8"/>
+    <p:sldId id="263" r:id="rId9"/>
+    <p:sldId id="264" r:id="rId10"/>
+    <p:sldId id="265" r:id="rId11"/>
+    <p:sldId id="266" r:id="rId12"/>
   </p:sldIdLst>
   <p:sldSz cx="12192000" cy="6858000"/>
   <p:notesSz cx="6858000" cy="9144000"/>
@@ -107,6 +114,11 @@
       </a:defRPr>
     </a:lvl9pPr>
   </p:defaultTextStyle>
+  <p:extLst>
+    <p:ext uri="{EFAFB233-063F-42B5-8137-9DF3F51BA10A}">
+      <p15:sldGuideLst xmlns:p15="http://schemas.microsoft.com/office/powerpoint/2012/main"/>
+    </p:ext>
+  </p:extLst>
 </p:presentation>
 </file>
 
@@ -286,7 +298,7 @@
           <a:p>
             <a:fld id="{0C5D2A7E-7DEB-4B43-877F-7D7CF71F41CF}" type="datetimeFigureOut">
               <a:rPr lang="en-IN" smtClean="0"/>
-              <a:t>06-04-2022</a:t>
+              <a:t>07-04-2022</a:t>
             </a:fld>
             <a:endParaRPr lang="en-IN"/>
           </a:p>
@@ -456,7 +468,7 @@
           <a:p>
             <a:fld id="{0C5D2A7E-7DEB-4B43-877F-7D7CF71F41CF}" type="datetimeFigureOut">
               <a:rPr lang="en-IN" smtClean="0"/>
-              <a:t>06-04-2022</a:t>
+              <a:t>07-04-2022</a:t>
             </a:fld>
             <a:endParaRPr lang="en-IN"/>
           </a:p>
@@ -679,7 +691,7 @@
           <a:p>
             <a:fld id="{0C5D2A7E-7DEB-4B43-877F-7D7CF71F41CF}" type="datetimeFigureOut">
               <a:rPr lang="en-IN" smtClean="0"/>
-              <a:t>06-04-2022</a:t>
+              <a:t>07-04-2022</a:t>
             </a:fld>
             <a:endParaRPr lang="en-IN"/>
           </a:p>
@@ -859,7 +871,7 @@
           <a:p>
             <a:fld id="{0C5D2A7E-7DEB-4B43-877F-7D7CF71F41CF}" type="datetimeFigureOut">
               <a:rPr lang="en-IN" smtClean="0"/>
-              <a:t>06-04-2022</a:t>
+              <a:t>07-04-2022</a:t>
             </a:fld>
             <a:endParaRPr lang="en-IN"/>
           </a:p>
@@ -1165,7 +1177,7 @@
           <a:p>
             <a:fld id="{0C5D2A7E-7DEB-4B43-877F-7D7CF71F41CF}" type="datetimeFigureOut">
               <a:rPr lang="en-IN" smtClean="0"/>
-              <a:t>06-04-2022</a:t>
+              <a:t>07-04-2022</a:t>
             </a:fld>
             <a:endParaRPr lang="en-IN"/>
           </a:p>
@@ -1469,7 +1481,7 @@
           <a:p>
             <a:fld id="{0C5D2A7E-7DEB-4B43-877F-7D7CF71F41CF}" type="datetimeFigureOut">
               <a:rPr lang="en-IN" smtClean="0"/>
-              <a:t>06-04-2022</a:t>
+              <a:t>07-04-2022</a:t>
             </a:fld>
             <a:endParaRPr lang="en-IN"/>
           </a:p>
@@ -1891,7 +1903,7 @@
           <a:p>
             <a:fld id="{0C5D2A7E-7DEB-4B43-877F-7D7CF71F41CF}" type="datetimeFigureOut">
               <a:rPr lang="en-IN" smtClean="0"/>
-              <a:t>06-04-2022</a:t>
+              <a:t>07-04-2022</a:t>
             </a:fld>
             <a:endParaRPr lang="en-IN"/>
           </a:p>
@@ -2009,7 +2021,7 @@
           <a:p>
             <a:fld id="{0C5D2A7E-7DEB-4B43-877F-7D7CF71F41CF}" type="datetimeFigureOut">
               <a:rPr lang="en-IN" smtClean="0"/>
-              <a:t>06-04-2022</a:t>
+              <a:t>07-04-2022</a:t>
             </a:fld>
             <a:endParaRPr lang="en-IN"/>
           </a:p>
@@ -2104,7 +2116,7 @@
           <a:p>
             <a:fld id="{0C5D2A7E-7DEB-4B43-877F-7D7CF71F41CF}" type="datetimeFigureOut">
               <a:rPr lang="en-IN" smtClean="0"/>
-              <a:t>06-04-2022</a:t>
+              <a:t>07-04-2022</a:t>
             </a:fld>
             <a:endParaRPr lang="en-IN"/>
           </a:p>
@@ -2377,7 +2389,7 @@
           <a:p>
             <a:fld id="{0C5D2A7E-7DEB-4B43-877F-7D7CF71F41CF}" type="datetimeFigureOut">
               <a:rPr lang="en-IN" smtClean="0"/>
-              <a:t>06-04-2022</a:t>
+              <a:t>07-04-2022</a:t>
             </a:fld>
             <a:endParaRPr lang="en-IN"/>
           </a:p>
@@ -2642,7 +2654,7 @@
           <a:p>
             <a:fld id="{0C5D2A7E-7DEB-4B43-877F-7D7CF71F41CF}" type="datetimeFigureOut">
               <a:rPr lang="en-IN" smtClean="0"/>
-              <a:t>06-04-2022</a:t>
+              <a:t>07-04-2022</a:t>
             </a:fld>
             <a:endParaRPr lang="en-IN"/>
           </a:p>
@@ -2891,7 +2903,7 @@
           <a:p>
             <a:fld id="{0C5D2A7E-7DEB-4B43-877F-7D7CF71F41CF}" type="datetimeFigureOut">
               <a:rPr lang="en-IN" smtClean="0"/>
-              <a:t>06-04-2022</a:t>
+              <a:t>07-04-2022</a:t>
             </a:fld>
             <a:endParaRPr lang="en-IN"/>
           </a:p>
@@ -3464,6 +3476,211 @@
 </p:sld>
 </file>
 
+<file path=ppt/slides/slide10.xml><?xml version="1.0" encoding="utf-8"?>
+<p:sld xmlns:a="http://schemas.openxmlformats.org/drawingml/2006/main" xmlns:r="http://schemas.openxmlformats.org/officeDocument/2006/relationships" xmlns:p="http://schemas.openxmlformats.org/presentationml/2006/main">
+  <p:cSld>
+    <p:spTree>
+      <p:nvGrpSpPr>
+        <p:cNvPr id="1" name=""/>
+        <p:cNvGrpSpPr/>
+        <p:nvPr/>
+      </p:nvGrpSpPr>
+      <p:grpSpPr>
+        <a:xfrm>
+          <a:off x="0" y="0"/>
+          <a:ext cx="0" cy="0"/>
+          <a:chOff x="0" y="0"/>
+          <a:chExt cx="0" cy="0"/>
+        </a:xfrm>
+      </p:grpSpPr>
+      <p:sp>
+        <p:nvSpPr>
+          <p:cNvPr id="2" name="Title 1">
+            <a:extLst>
+              <a:ext uri="{FF2B5EF4-FFF2-40B4-BE49-F238E27FC236}">
+                <a16:creationId xmlns:a16="http://schemas.microsoft.com/office/drawing/2014/main" id="{14CED1CB-CF2E-4940-966C-46319C3FCF54}"/>
+              </a:ext>
+            </a:extLst>
+          </p:cNvPr>
+          <p:cNvSpPr>
+            <a:spLocks noGrp="1"/>
+          </p:cNvSpPr>
+          <p:nvPr>
+            <p:ph type="title"/>
+          </p:nvPr>
+        </p:nvSpPr>
+        <p:spPr/>
+        <p:txBody>
+          <a:bodyPr/>
+          <a:lstStyle/>
+          <a:p>
+            <a:r>
+              <a:rPr lang="en-US" dirty="0"/>
+              <a:t>Root requirements</a:t>
+            </a:r>
+            <a:endParaRPr lang="en-IN" dirty="0"/>
+          </a:p>
+        </p:txBody>
+      </p:sp>
+      <p:sp>
+        <p:nvSpPr>
+          <p:cNvPr id="3" name="Content Placeholder 2">
+            <a:extLst>
+              <a:ext uri="{FF2B5EF4-FFF2-40B4-BE49-F238E27FC236}">
+                <a16:creationId xmlns:a16="http://schemas.microsoft.com/office/drawing/2014/main" id="{8FDAC095-30D8-40F6-9CCF-70498E070373}"/>
+              </a:ext>
+            </a:extLst>
+          </p:cNvPr>
+          <p:cNvSpPr>
+            <a:spLocks noGrp="1"/>
+          </p:cNvSpPr>
+          <p:nvPr>
+            <p:ph idx="1"/>
+          </p:nvPr>
+        </p:nvSpPr>
+        <p:spPr/>
+        <p:txBody>
+          <a:bodyPr/>
+          <a:lstStyle/>
+          <a:p>
+            <a:r>
+              <a:rPr lang="en-US" dirty="0"/>
+              <a:t>Root is super user of this website who has access to all the features and functionalities available on the website. User with type ‘R’ is considered Root. </a:t>
+            </a:r>
+          </a:p>
+          <a:p>
+            <a:r>
+              <a:rPr lang="en-US" dirty="0"/>
+              <a:t>Root can Delete Category/City/Facility/Property/User.</a:t>
+            </a:r>
+          </a:p>
+          <a:p>
+            <a:r>
+              <a:rPr lang="en-US" dirty="0"/>
+              <a:t>Root can modify Page content from CMS menu which is only accessible by type ‘R’ User or Root user.</a:t>
+            </a:r>
+          </a:p>
+          <a:p>
+            <a:r>
+              <a:rPr lang="en-US" dirty="0"/>
+              <a:t>Root can change site title, logo, and contact details from Site Settings option. </a:t>
+            </a:r>
+          </a:p>
+          <a:p>
+            <a:endParaRPr lang="en-IN" dirty="0"/>
+          </a:p>
+        </p:txBody>
+      </p:sp>
+    </p:spTree>
+    <p:extLst>
+      <p:ext uri="{BB962C8B-B14F-4D97-AF65-F5344CB8AC3E}">
+        <p14:creationId xmlns:p14="http://schemas.microsoft.com/office/powerpoint/2010/main" val="752180981"/>
+      </p:ext>
+    </p:extLst>
+  </p:cSld>
+  <p:clrMapOvr>
+    <a:masterClrMapping/>
+  </p:clrMapOvr>
+</p:sld>
+</file>
+
+<file path=ppt/slides/slide11.xml><?xml version="1.0" encoding="utf-8"?>
+<p:sld xmlns:a="http://schemas.openxmlformats.org/drawingml/2006/main" xmlns:r="http://schemas.openxmlformats.org/officeDocument/2006/relationships" xmlns:p="http://schemas.openxmlformats.org/presentationml/2006/main">
+  <p:cSld>
+    <p:spTree>
+      <p:nvGrpSpPr>
+        <p:cNvPr id="1" name=""/>
+        <p:cNvGrpSpPr/>
+        <p:nvPr/>
+      </p:nvGrpSpPr>
+      <p:grpSpPr>
+        <a:xfrm>
+          <a:off x="0" y="0"/>
+          <a:ext cx="0" cy="0"/>
+          <a:chOff x="0" y="0"/>
+          <a:chExt cx="0" cy="0"/>
+        </a:xfrm>
+      </p:grpSpPr>
+      <p:sp>
+        <p:nvSpPr>
+          <p:cNvPr id="2" name="Title 1">
+            <a:extLst>
+              <a:ext uri="{FF2B5EF4-FFF2-40B4-BE49-F238E27FC236}">
+                <a16:creationId xmlns:a16="http://schemas.microsoft.com/office/drawing/2014/main" id="{4B09DE8B-ED3E-417A-A92E-A5AE93786814}"/>
+              </a:ext>
+            </a:extLst>
+          </p:cNvPr>
+          <p:cNvSpPr>
+            <a:spLocks noGrp="1"/>
+          </p:cNvSpPr>
+          <p:nvPr>
+            <p:ph type="title"/>
+          </p:nvPr>
+        </p:nvSpPr>
+        <p:spPr/>
+        <p:txBody>
+          <a:bodyPr/>
+          <a:lstStyle/>
+          <a:p>
+            <a:r>
+              <a:rPr lang="en-US" dirty="0"/>
+              <a:t>Context level DFD</a:t>
+            </a:r>
+            <a:endParaRPr lang="en-IN" dirty="0"/>
+          </a:p>
+        </p:txBody>
+      </p:sp>
+      <p:pic>
+        <p:nvPicPr>
+          <p:cNvPr id="4" name="Content Placeholder 3">
+            <a:extLst>
+              <a:ext uri="{FF2B5EF4-FFF2-40B4-BE49-F238E27FC236}">
+                <a16:creationId xmlns:a16="http://schemas.microsoft.com/office/drawing/2014/main" id="{D3AF1D56-A8D2-410F-9558-8F84E062F7AF}"/>
+              </a:ext>
+            </a:extLst>
+          </p:cNvPr>
+          <p:cNvPicPr>
+            <a:picLocks noGrp="1" noChangeAspect="1"/>
+          </p:cNvPicPr>
+          <p:nvPr>
+            <p:ph idx="1"/>
+          </p:nvPr>
+        </p:nvPicPr>
+        <p:blipFill>
+          <a:blip r:embed="rId2" cstate="print">
+            <a:extLst>
+              <a:ext uri="{28A0092B-C50C-407E-A947-70E740481C1C}">
+                <a14:useLocalDpi xmlns:a14="http://schemas.microsoft.com/office/drawing/2010/main"/>
+              </a:ext>
+            </a:extLst>
+          </a:blip>
+          <a:stretch>
+            <a:fillRect/>
+          </a:stretch>
+        </p:blipFill>
+        <p:spPr>
+          <a:xfrm>
+            <a:off x="1901986" y="2205213"/>
+            <a:ext cx="8385946" cy="3566160"/>
+          </a:xfrm>
+          <a:prstGeom prst="rect">
+            <a:avLst/>
+          </a:prstGeom>
+        </p:spPr>
+      </p:pic>
+    </p:spTree>
+    <p:extLst>
+      <p:ext uri="{BB962C8B-B14F-4D97-AF65-F5344CB8AC3E}">
+        <p14:creationId xmlns:p14="http://schemas.microsoft.com/office/powerpoint/2010/main" val="1682394285"/>
+      </p:ext>
+    </p:extLst>
+  </p:cSld>
+  <p:clrMapOvr>
+    <a:masterClrMapping/>
+  </p:clrMapOvr>
+</p:sld>
+</file>
+
 <file path=ppt/slides/slide2.xml><?xml version="1.0" encoding="utf-8"?>
 <p:sld xmlns:a="http://schemas.openxmlformats.org/drawingml/2006/main" xmlns:r="http://schemas.openxmlformats.org/officeDocument/2006/relationships" xmlns:p="http://schemas.openxmlformats.org/presentationml/2006/main">
   <p:cSld>
@@ -4747,31 +4964,170 @@
           </a:p>
         </p:txBody>
       </p:sp>
-      <p:sp>
-        <p:nvSpPr>
-          <p:cNvPr id="4" name="Content Placeholder 3">
+      <p:graphicFrame>
+        <p:nvGraphicFramePr>
+          <p:cNvPr id="7" name="Table 7">
             <a:extLst>
               <a:ext uri="{FF2B5EF4-FFF2-40B4-BE49-F238E27FC236}">
-                <a16:creationId xmlns:a16="http://schemas.microsoft.com/office/drawing/2014/main" id="{D3104F75-A040-425A-9F5F-119D7A9F563A}"/>
+                <a16:creationId xmlns:a16="http://schemas.microsoft.com/office/drawing/2014/main" id="{65879DAB-0D71-443A-BA73-40037AEBF5B0}"/>
               </a:ext>
             </a:extLst>
           </p:cNvPr>
-          <p:cNvSpPr>
-            <a:spLocks noGrp="1"/>
-          </p:cNvSpPr>
+          <p:cNvGraphicFramePr>
+            <a:graphicFrameLocks noGrp="1"/>
+          </p:cNvGraphicFramePr>
           <p:nvPr>
             <p:ph sz="half" idx="2"/>
-          </p:nvPr>
-        </p:nvSpPr>
-        <p:spPr/>
-        <p:txBody>
-          <a:bodyPr/>
-          <a:lstStyle/>
-          <a:p>
-            <a:endParaRPr lang="en-IN"/>
-          </a:p>
-        </p:txBody>
-      </p:sp>
+            <p:extLst>
+              <p:ext uri="{D42A27DB-BD31-4B8C-83A1-F6EECF244321}">
+                <p14:modId xmlns:p14="http://schemas.microsoft.com/office/powerpoint/2010/main" val="740337922"/>
+              </p:ext>
+            </p:extLst>
+          </p:nvPr>
+        </p:nvGraphicFramePr>
+        <p:xfrm>
+          <a:off x="1206500" y="2655887"/>
+          <a:ext cx="4756150" cy="1924992"/>
+        </p:xfrm>
+        <a:graphic>
+          <a:graphicData uri="http://schemas.openxmlformats.org/drawingml/2006/table">
+            <a:tbl>
+              <a:tblPr bandRow="1">
+                <a:tableStyleId>{5C22544A-7EE6-4342-B048-85BDC9FD1C3A}</a:tableStyleId>
+              </a:tblPr>
+              <a:tblGrid>
+                <a:gridCol w="2378075">
+                  <a:extLst>
+                    <a:ext uri="{9D8B030D-6E8A-4147-A177-3AD203B41FA5}">
+                      <a16:colId xmlns:a16="http://schemas.microsoft.com/office/drawing/2014/main" val="3552138136"/>
+                    </a:ext>
+                  </a:extLst>
+                </a:gridCol>
+                <a:gridCol w="2378075">
+                  <a:extLst>
+                    <a:ext uri="{9D8B030D-6E8A-4147-A177-3AD203B41FA5}">
+                      <a16:colId xmlns:a16="http://schemas.microsoft.com/office/drawing/2014/main" val="4267389227"/>
+                    </a:ext>
+                  </a:extLst>
+                </a:gridCol>
+              </a:tblGrid>
+              <a:tr h="641664">
+                <a:tc>
+                  <a:txBody>
+                    <a:bodyPr/>
+                    <a:lstStyle/>
+                    <a:p>
+                      <a:r>
+                        <a:rPr lang="en-US" b="1" dirty="0"/>
+                        <a:t>Processor</a:t>
+                      </a:r>
+                      <a:endParaRPr lang="en-IN" b="1" dirty="0"/>
+                    </a:p>
+                  </a:txBody>
+                  <a:tcPr anchor="ctr"/>
+                </a:tc>
+                <a:tc>
+                  <a:txBody>
+                    <a:bodyPr/>
+                    <a:lstStyle/>
+                    <a:p>
+                      <a:r>
+                        <a:rPr lang="en-US" dirty="0"/>
+                        <a:t>3</a:t>
+                      </a:r>
+                      <a:r>
+                        <a:rPr lang="en-US" baseline="30000" dirty="0"/>
+                        <a:t>rd</a:t>
+                      </a:r>
+                      <a:r>
+                        <a:rPr lang="en-US" dirty="0"/>
+                        <a:t> Gen and above</a:t>
+                      </a:r>
+                      <a:endParaRPr lang="en-IN" dirty="0"/>
+                    </a:p>
+                  </a:txBody>
+                  <a:tcPr anchor="ctr"/>
+                </a:tc>
+                <a:extLst>
+                  <a:ext uri="{0D108BD9-81ED-4DB2-BD59-A6C34878D82A}">
+                    <a16:rowId xmlns:a16="http://schemas.microsoft.com/office/drawing/2014/main" val="1089670808"/>
+                  </a:ext>
+                </a:extLst>
+              </a:tr>
+              <a:tr h="641664">
+                <a:tc>
+                  <a:txBody>
+                    <a:bodyPr/>
+                    <a:lstStyle/>
+                    <a:p>
+                      <a:r>
+                        <a:rPr lang="en-US" b="1" dirty="0"/>
+                        <a:t>Memory</a:t>
+                      </a:r>
+                      <a:endParaRPr lang="en-IN" b="1" dirty="0"/>
+                    </a:p>
+                  </a:txBody>
+                  <a:tcPr anchor="ctr"/>
+                </a:tc>
+                <a:tc>
+                  <a:txBody>
+                    <a:bodyPr/>
+                    <a:lstStyle/>
+                    <a:p>
+                      <a:r>
+                        <a:rPr lang="en-US" dirty="0"/>
+                        <a:t>4 GB and above</a:t>
+                      </a:r>
+                      <a:endParaRPr lang="en-IN" dirty="0"/>
+                    </a:p>
+                  </a:txBody>
+                  <a:tcPr anchor="ctr"/>
+                </a:tc>
+                <a:extLst>
+                  <a:ext uri="{0D108BD9-81ED-4DB2-BD59-A6C34878D82A}">
+                    <a16:rowId xmlns:a16="http://schemas.microsoft.com/office/drawing/2014/main" val="1782672493"/>
+                  </a:ext>
+                </a:extLst>
+              </a:tr>
+              <a:tr h="641664">
+                <a:tc>
+                  <a:txBody>
+                    <a:bodyPr/>
+                    <a:lstStyle/>
+                    <a:p>
+                      <a:r>
+                        <a:rPr lang="en-US" b="1" dirty="0"/>
+                        <a:t>Storage</a:t>
+                      </a:r>
+                      <a:endParaRPr lang="en-IN" b="1" dirty="0"/>
+                    </a:p>
+                  </a:txBody>
+                  <a:tcPr anchor="ctr"/>
+                </a:tc>
+                <a:tc>
+                  <a:txBody>
+                    <a:bodyPr/>
+                    <a:lstStyle/>
+                    <a:p>
+                      <a:r>
+                        <a:rPr lang="en-US" dirty="0"/>
+                        <a:t>6 GB and above</a:t>
+                      </a:r>
+                      <a:endParaRPr lang="en-IN" dirty="0"/>
+                    </a:p>
+                  </a:txBody>
+                  <a:tcPr anchor="ctr"/>
+                </a:tc>
+                <a:extLst>
+                  <a:ext uri="{0D108BD9-81ED-4DB2-BD59-A6C34878D82A}">
+                    <a16:rowId xmlns:a16="http://schemas.microsoft.com/office/drawing/2014/main" val="680929299"/>
+                  </a:ext>
+                </a:extLst>
+              </a:tr>
+            </a:tbl>
+          </a:graphicData>
+        </a:graphic>
+      </p:graphicFrame>
       <p:sp>
         <p:nvSpPr>
           <p:cNvPr id="5" name="Text Placeholder 4">
@@ -4793,39 +5149,1673 @@
           <a:bodyPr/>
           <a:lstStyle/>
           <a:p>
-            <a:endParaRPr lang="en-IN"/>
-          </a:p>
-        </p:txBody>
-      </p:sp>
-      <p:sp>
-        <p:nvSpPr>
-          <p:cNvPr id="6" name="Content Placeholder 5">
+            <a:r>
+              <a:rPr lang="en-US" dirty="0"/>
+              <a:t>Client</a:t>
+            </a:r>
+            <a:endParaRPr lang="en-IN" dirty="0"/>
+          </a:p>
+        </p:txBody>
+      </p:sp>
+      <p:graphicFrame>
+        <p:nvGraphicFramePr>
+          <p:cNvPr id="8" name="Table 8">
             <a:extLst>
               <a:ext uri="{FF2B5EF4-FFF2-40B4-BE49-F238E27FC236}">
-                <a16:creationId xmlns:a16="http://schemas.microsoft.com/office/drawing/2014/main" id="{6920D81E-3510-42D0-A299-51119606B067}"/>
+                <a16:creationId xmlns:a16="http://schemas.microsoft.com/office/drawing/2014/main" id="{3F59B530-71F9-4946-A1A8-729A632A8644}"/>
               </a:ext>
             </a:extLst>
           </p:cNvPr>
-          <p:cNvSpPr>
-            <a:spLocks noGrp="1"/>
-          </p:cNvSpPr>
+          <p:cNvGraphicFramePr>
+            <a:graphicFrameLocks noGrp="1"/>
+          </p:cNvGraphicFramePr>
           <p:nvPr>
             <p:ph sz="quarter" idx="4"/>
-          </p:nvPr>
-        </p:nvSpPr>
-        <p:spPr/>
-        <p:txBody>
-          <a:bodyPr/>
-          <a:lstStyle/>
-          <a:p>
-            <a:endParaRPr lang="en-IN"/>
-          </a:p>
-        </p:txBody>
-      </p:sp>
+            <p:extLst>
+              <p:ext uri="{D42A27DB-BD31-4B8C-83A1-F6EECF244321}">
+                <p14:modId xmlns:p14="http://schemas.microsoft.com/office/powerpoint/2010/main" val="3767771546"/>
+              </p:ext>
+            </p:extLst>
+          </p:nvPr>
+        </p:nvGraphicFramePr>
+        <p:xfrm>
+          <a:off x="6230938" y="2655887"/>
+          <a:ext cx="4754562" cy="1924992"/>
+        </p:xfrm>
+        <a:graphic>
+          <a:graphicData uri="http://schemas.openxmlformats.org/drawingml/2006/table">
+            <a:tbl>
+              <a:tblPr bandRow="1">
+                <a:tableStyleId>{5C22544A-7EE6-4342-B048-85BDC9FD1C3A}</a:tableStyleId>
+              </a:tblPr>
+              <a:tblGrid>
+                <a:gridCol w="2377281">
+                  <a:extLst>
+                    <a:ext uri="{9D8B030D-6E8A-4147-A177-3AD203B41FA5}">
+                      <a16:colId xmlns:a16="http://schemas.microsoft.com/office/drawing/2014/main" val="577589525"/>
+                    </a:ext>
+                  </a:extLst>
+                </a:gridCol>
+                <a:gridCol w="2377281">
+                  <a:extLst>
+                    <a:ext uri="{9D8B030D-6E8A-4147-A177-3AD203B41FA5}">
+                      <a16:colId xmlns:a16="http://schemas.microsoft.com/office/drawing/2014/main" val="472015466"/>
+                    </a:ext>
+                  </a:extLst>
+                </a:gridCol>
+              </a:tblGrid>
+              <a:tr h="641664">
+                <a:tc>
+                  <a:txBody>
+                    <a:bodyPr/>
+                    <a:lstStyle/>
+                    <a:p>
+                      <a:r>
+                        <a:rPr lang="en-US" b="1" dirty="0"/>
+                        <a:t>Processor</a:t>
+                      </a:r>
+                      <a:endParaRPr lang="en-IN" b="1" dirty="0"/>
+                    </a:p>
+                  </a:txBody>
+                  <a:tcPr anchor="ctr"/>
+                </a:tc>
+                <a:tc>
+                  <a:txBody>
+                    <a:bodyPr/>
+                    <a:lstStyle/>
+                    <a:p>
+                      <a:r>
+                        <a:rPr lang="en-US" dirty="0"/>
+                        <a:t>3</a:t>
+                      </a:r>
+                      <a:r>
+                        <a:rPr lang="en-US" baseline="30000" dirty="0"/>
+                        <a:t>rd</a:t>
+                      </a:r>
+                      <a:r>
+                        <a:rPr lang="en-US" dirty="0"/>
+                        <a:t> Gen and above</a:t>
+                      </a:r>
+                      <a:endParaRPr lang="en-IN" dirty="0"/>
+                    </a:p>
+                  </a:txBody>
+                  <a:tcPr anchor="ctr"/>
+                </a:tc>
+                <a:extLst>
+                  <a:ext uri="{0D108BD9-81ED-4DB2-BD59-A6C34878D82A}">
+                    <a16:rowId xmlns:a16="http://schemas.microsoft.com/office/drawing/2014/main" val="767069744"/>
+                  </a:ext>
+                </a:extLst>
+              </a:tr>
+              <a:tr h="641664">
+                <a:tc>
+                  <a:txBody>
+                    <a:bodyPr/>
+                    <a:lstStyle/>
+                    <a:p>
+                      <a:r>
+                        <a:rPr lang="en-US" b="1" dirty="0"/>
+                        <a:t>Memory</a:t>
+                      </a:r>
+                      <a:endParaRPr lang="en-IN" b="1" dirty="0"/>
+                    </a:p>
+                  </a:txBody>
+                  <a:tcPr anchor="ctr"/>
+                </a:tc>
+                <a:tc>
+                  <a:txBody>
+                    <a:bodyPr/>
+                    <a:lstStyle/>
+                    <a:p>
+                      <a:r>
+                        <a:rPr lang="en-US" dirty="0"/>
+                        <a:t>4 GB and above</a:t>
+                      </a:r>
+                      <a:endParaRPr lang="en-IN" dirty="0"/>
+                    </a:p>
+                  </a:txBody>
+                  <a:tcPr anchor="ctr"/>
+                </a:tc>
+                <a:extLst>
+                  <a:ext uri="{0D108BD9-81ED-4DB2-BD59-A6C34878D82A}">
+                    <a16:rowId xmlns:a16="http://schemas.microsoft.com/office/drawing/2014/main" val="4069471647"/>
+                  </a:ext>
+                </a:extLst>
+              </a:tr>
+              <a:tr h="641664">
+                <a:tc>
+                  <a:txBody>
+                    <a:bodyPr/>
+                    <a:lstStyle/>
+                    <a:p>
+                      <a:r>
+                        <a:rPr lang="en-US" b="1" dirty="0"/>
+                        <a:t>Storage</a:t>
+                      </a:r>
+                      <a:endParaRPr lang="en-IN" b="1" dirty="0"/>
+                    </a:p>
+                  </a:txBody>
+                  <a:tcPr anchor="ctr"/>
+                </a:tc>
+                <a:tc>
+                  <a:txBody>
+                    <a:bodyPr/>
+                    <a:lstStyle/>
+                    <a:p>
+                      <a:r>
+                        <a:rPr lang="en-US" dirty="0"/>
+                        <a:t>6 GB and above</a:t>
+                      </a:r>
+                      <a:endParaRPr lang="en-IN" dirty="0"/>
+                    </a:p>
+                  </a:txBody>
+                  <a:tcPr anchor="ctr"/>
+                </a:tc>
+                <a:extLst>
+                  <a:ext uri="{0D108BD9-81ED-4DB2-BD59-A6C34878D82A}">
+                    <a16:rowId xmlns:a16="http://schemas.microsoft.com/office/drawing/2014/main" val="1261525462"/>
+                  </a:ext>
+                </a:extLst>
+              </a:tr>
+            </a:tbl>
+          </a:graphicData>
+        </a:graphic>
+      </p:graphicFrame>
     </p:spTree>
     <p:extLst>
       <p:ext uri="{BB962C8B-B14F-4D97-AF65-F5344CB8AC3E}">
         <p14:creationId xmlns:p14="http://schemas.microsoft.com/office/powerpoint/2010/main" val="3792373033"/>
+      </p:ext>
+    </p:extLst>
+  </p:cSld>
+  <p:clrMapOvr>
+    <a:masterClrMapping/>
+  </p:clrMapOvr>
+</p:sld>
+</file>
+
+<file path=ppt/slides/slide5.xml><?xml version="1.0" encoding="utf-8"?>
+<p:sld xmlns:a="http://schemas.openxmlformats.org/drawingml/2006/main" xmlns:r="http://schemas.openxmlformats.org/officeDocument/2006/relationships" xmlns:p="http://schemas.openxmlformats.org/presentationml/2006/main">
+  <p:cSld>
+    <p:spTree>
+      <p:nvGrpSpPr>
+        <p:cNvPr id="1" name=""/>
+        <p:cNvGrpSpPr/>
+        <p:nvPr/>
+      </p:nvGrpSpPr>
+      <p:grpSpPr>
+        <a:xfrm>
+          <a:off x="0" y="0"/>
+          <a:ext cx="0" cy="0"/>
+          <a:chOff x="0" y="0"/>
+          <a:chExt cx="0" cy="0"/>
+        </a:xfrm>
+      </p:grpSpPr>
+      <p:sp>
+        <p:nvSpPr>
+          <p:cNvPr id="2" name="Title 1">
+            <a:extLst>
+              <a:ext uri="{FF2B5EF4-FFF2-40B4-BE49-F238E27FC236}">
+                <a16:creationId xmlns:a16="http://schemas.microsoft.com/office/drawing/2014/main" id="{C87EC814-72DE-4610-A12C-39B3801BEE3D}"/>
+              </a:ext>
+            </a:extLst>
+          </p:cNvPr>
+          <p:cNvSpPr>
+            <a:spLocks noGrp="1"/>
+          </p:cNvSpPr>
+          <p:nvPr>
+            <p:ph type="title"/>
+          </p:nvPr>
+        </p:nvSpPr>
+        <p:spPr/>
+        <p:txBody>
+          <a:bodyPr/>
+          <a:lstStyle/>
+          <a:p>
+            <a:r>
+              <a:rPr lang="en-US" dirty="0"/>
+              <a:t>s/w requirements</a:t>
+            </a:r>
+            <a:endParaRPr lang="en-IN" dirty="0"/>
+          </a:p>
+        </p:txBody>
+      </p:sp>
+      <p:sp>
+        <p:nvSpPr>
+          <p:cNvPr id="3" name="Text Placeholder 2">
+            <a:extLst>
+              <a:ext uri="{FF2B5EF4-FFF2-40B4-BE49-F238E27FC236}">
+                <a16:creationId xmlns:a16="http://schemas.microsoft.com/office/drawing/2014/main" id="{ED4784C0-08BC-4D8C-AE98-D1B476150B7E}"/>
+              </a:ext>
+            </a:extLst>
+          </p:cNvPr>
+          <p:cNvSpPr>
+            <a:spLocks noGrp="1"/>
+          </p:cNvSpPr>
+          <p:nvPr>
+            <p:ph type="body" idx="1"/>
+          </p:nvPr>
+        </p:nvSpPr>
+        <p:spPr/>
+        <p:txBody>
+          <a:bodyPr/>
+          <a:lstStyle/>
+          <a:p>
+            <a:r>
+              <a:rPr lang="en-US" dirty="0"/>
+              <a:t>Server</a:t>
+            </a:r>
+            <a:endParaRPr lang="en-IN" dirty="0"/>
+          </a:p>
+        </p:txBody>
+      </p:sp>
+      <p:graphicFrame>
+        <p:nvGraphicFramePr>
+          <p:cNvPr id="7" name="Table 7">
+            <a:extLst>
+              <a:ext uri="{FF2B5EF4-FFF2-40B4-BE49-F238E27FC236}">
+                <a16:creationId xmlns:a16="http://schemas.microsoft.com/office/drawing/2014/main" id="{65879DAB-0D71-443A-BA73-40037AEBF5B0}"/>
+              </a:ext>
+            </a:extLst>
+          </p:cNvPr>
+          <p:cNvGraphicFramePr>
+            <a:graphicFrameLocks noGrp="1"/>
+          </p:cNvGraphicFramePr>
+          <p:nvPr>
+            <p:ph sz="half" idx="2"/>
+            <p:extLst>
+              <p:ext uri="{D42A27DB-BD31-4B8C-83A1-F6EECF244321}">
+                <p14:modId xmlns:p14="http://schemas.microsoft.com/office/powerpoint/2010/main" val="2318855609"/>
+              </p:ext>
+            </p:extLst>
+          </p:nvPr>
+        </p:nvGraphicFramePr>
+        <p:xfrm>
+          <a:off x="1206500" y="2655887"/>
+          <a:ext cx="4756150" cy="2839392"/>
+        </p:xfrm>
+        <a:graphic>
+          <a:graphicData uri="http://schemas.openxmlformats.org/drawingml/2006/table">
+            <a:tbl>
+              <a:tblPr bandRow="1">
+                <a:tableStyleId>{5C22544A-7EE6-4342-B048-85BDC9FD1C3A}</a:tableStyleId>
+              </a:tblPr>
+              <a:tblGrid>
+                <a:gridCol w="2378075">
+                  <a:extLst>
+                    <a:ext uri="{9D8B030D-6E8A-4147-A177-3AD203B41FA5}">
+                      <a16:colId xmlns:a16="http://schemas.microsoft.com/office/drawing/2014/main" val="3552138136"/>
+                    </a:ext>
+                  </a:extLst>
+                </a:gridCol>
+                <a:gridCol w="2378075">
+                  <a:extLst>
+                    <a:ext uri="{9D8B030D-6E8A-4147-A177-3AD203B41FA5}">
+                      <a16:colId xmlns:a16="http://schemas.microsoft.com/office/drawing/2014/main" val="4267389227"/>
+                    </a:ext>
+                  </a:extLst>
+                </a:gridCol>
+              </a:tblGrid>
+              <a:tr h="641664">
+                <a:tc>
+                  <a:txBody>
+                    <a:bodyPr/>
+                    <a:lstStyle/>
+                    <a:p>
+                      <a:r>
+                        <a:rPr lang="en-US" b="1" dirty="0"/>
+                        <a:t>Operating System</a:t>
+                      </a:r>
+                      <a:endParaRPr lang="en-IN" b="1" dirty="0"/>
+                    </a:p>
+                  </a:txBody>
+                  <a:tcPr anchor="ctr"/>
+                </a:tc>
+                <a:tc>
+                  <a:txBody>
+                    <a:bodyPr/>
+                    <a:lstStyle/>
+                    <a:p>
+                      <a:r>
+                        <a:rPr lang="en-US" dirty="0"/>
+                        <a:t>Windows 7 and above</a:t>
+                      </a:r>
+                    </a:p>
+                    <a:p>
+                      <a:r>
+                        <a:rPr lang="en-US" dirty="0"/>
+                        <a:t>Any </a:t>
+                      </a:r>
+                      <a:r>
+                        <a:rPr lang="en-US" dirty="0" err="1"/>
+                        <a:t>linux</a:t>
+                      </a:r>
+                      <a:r>
+                        <a:rPr lang="en-US" dirty="0"/>
+                        <a:t> based on 64bit arch.</a:t>
+                      </a:r>
+                      <a:endParaRPr lang="en-IN" dirty="0"/>
+                    </a:p>
+                  </a:txBody>
+                  <a:tcPr anchor="ctr"/>
+                </a:tc>
+                <a:extLst>
+                  <a:ext uri="{0D108BD9-81ED-4DB2-BD59-A6C34878D82A}">
+                    <a16:rowId xmlns:a16="http://schemas.microsoft.com/office/drawing/2014/main" val="1089670808"/>
+                  </a:ext>
+                </a:extLst>
+              </a:tr>
+              <a:tr h="641664">
+                <a:tc>
+                  <a:txBody>
+                    <a:bodyPr/>
+                    <a:lstStyle/>
+                    <a:p>
+                      <a:r>
+                        <a:rPr lang="en-US" b="1" dirty="0"/>
+                        <a:t>Server</a:t>
+                      </a:r>
+                      <a:endParaRPr lang="en-IN" b="1" dirty="0"/>
+                    </a:p>
+                  </a:txBody>
+                  <a:tcPr anchor="ctr"/>
+                </a:tc>
+                <a:tc>
+                  <a:txBody>
+                    <a:bodyPr/>
+                    <a:lstStyle/>
+                    <a:p>
+                      <a:r>
+                        <a:rPr lang="en-US" dirty="0"/>
+                        <a:t>Apache v 2.4 and above</a:t>
+                      </a:r>
+                      <a:endParaRPr lang="en-IN" dirty="0"/>
+                    </a:p>
+                  </a:txBody>
+                  <a:tcPr anchor="ctr"/>
+                </a:tc>
+                <a:extLst>
+                  <a:ext uri="{0D108BD9-81ED-4DB2-BD59-A6C34878D82A}">
+                    <a16:rowId xmlns:a16="http://schemas.microsoft.com/office/drawing/2014/main" val="1782672493"/>
+                  </a:ext>
+                </a:extLst>
+              </a:tr>
+              <a:tr h="641664">
+                <a:tc>
+                  <a:txBody>
+                    <a:bodyPr/>
+                    <a:lstStyle/>
+                    <a:p>
+                      <a:r>
+                        <a:rPr lang="en-US" b="1" dirty="0" err="1"/>
+                        <a:t>Php</a:t>
+                      </a:r>
+                      <a:endParaRPr lang="en-IN" b="1" dirty="0"/>
+                    </a:p>
+                  </a:txBody>
+                  <a:tcPr anchor="ctr"/>
+                </a:tc>
+                <a:tc>
+                  <a:txBody>
+                    <a:bodyPr/>
+                    <a:lstStyle/>
+                    <a:p>
+                      <a:r>
+                        <a:rPr lang="en-US" dirty="0"/>
+                        <a:t>V6 and above</a:t>
+                      </a:r>
+                      <a:endParaRPr lang="en-IN" dirty="0"/>
+                    </a:p>
+                  </a:txBody>
+                  <a:tcPr anchor="ctr"/>
+                </a:tc>
+                <a:extLst>
+                  <a:ext uri="{0D108BD9-81ED-4DB2-BD59-A6C34878D82A}">
+                    <a16:rowId xmlns:a16="http://schemas.microsoft.com/office/drawing/2014/main" val="680929299"/>
+                  </a:ext>
+                </a:extLst>
+              </a:tr>
+              <a:tr h="641664">
+                <a:tc>
+                  <a:txBody>
+                    <a:bodyPr/>
+                    <a:lstStyle/>
+                    <a:p>
+                      <a:r>
+                        <a:rPr lang="en-US" b="1" dirty="0"/>
+                        <a:t>MySQL</a:t>
+                      </a:r>
+                      <a:endParaRPr lang="en-IN" b="1" dirty="0"/>
+                    </a:p>
+                  </a:txBody>
+                  <a:tcPr anchor="ctr"/>
+                </a:tc>
+                <a:tc>
+                  <a:txBody>
+                    <a:bodyPr/>
+                    <a:lstStyle/>
+                    <a:p>
+                      <a:r>
+                        <a:rPr lang="en-US" dirty="0"/>
+                        <a:t>V7 and above</a:t>
+                      </a:r>
+                      <a:endParaRPr lang="en-IN" dirty="0"/>
+                    </a:p>
+                  </a:txBody>
+                  <a:tcPr anchor="ctr"/>
+                </a:tc>
+                <a:extLst>
+                  <a:ext uri="{0D108BD9-81ED-4DB2-BD59-A6C34878D82A}">
+                    <a16:rowId xmlns:a16="http://schemas.microsoft.com/office/drawing/2014/main" val="2407399951"/>
+                  </a:ext>
+                </a:extLst>
+              </a:tr>
+            </a:tbl>
+          </a:graphicData>
+        </a:graphic>
+      </p:graphicFrame>
+      <p:sp>
+        <p:nvSpPr>
+          <p:cNvPr id="5" name="Text Placeholder 4">
+            <a:extLst>
+              <a:ext uri="{FF2B5EF4-FFF2-40B4-BE49-F238E27FC236}">
+                <a16:creationId xmlns:a16="http://schemas.microsoft.com/office/drawing/2014/main" id="{766C832C-3C20-4A0D-AE5B-DCA165C88936}"/>
+              </a:ext>
+            </a:extLst>
+          </p:cNvPr>
+          <p:cNvSpPr>
+            <a:spLocks noGrp="1"/>
+          </p:cNvSpPr>
+          <p:nvPr>
+            <p:ph type="body" sz="quarter" idx="3"/>
+          </p:nvPr>
+        </p:nvSpPr>
+        <p:spPr/>
+        <p:txBody>
+          <a:bodyPr/>
+          <a:lstStyle/>
+          <a:p>
+            <a:r>
+              <a:rPr lang="en-US" dirty="0"/>
+              <a:t>Client</a:t>
+            </a:r>
+            <a:endParaRPr lang="en-IN" dirty="0"/>
+          </a:p>
+        </p:txBody>
+      </p:sp>
+      <p:graphicFrame>
+        <p:nvGraphicFramePr>
+          <p:cNvPr id="8" name="Table 8">
+            <a:extLst>
+              <a:ext uri="{FF2B5EF4-FFF2-40B4-BE49-F238E27FC236}">
+                <a16:creationId xmlns:a16="http://schemas.microsoft.com/office/drawing/2014/main" id="{3F59B530-71F9-4946-A1A8-729A632A8644}"/>
+              </a:ext>
+            </a:extLst>
+          </p:cNvPr>
+          <p:cNvGraphicFramePr>
+            <a:graphicFrameLocks noGrp="1"/>
+          </p:cNvGraphicFramePr>
+          <p:nvPr>
+            <p:ph sz="quarter" idx="4"/>
+            <p:extLst>
+              <p:ext uri="{D42A27DB-BD31-4B8C-83A1-F6EECF244321}">
+                <p14:modId xmlns:p14="http://schemas.microsoft.com/office/powerpoint/2010/main" val="1439450289"/>
+              </p:ext>
+            </p:extLst>
+          </p:nvPr>
+        </p:nvGraphicFramePr>
+        <p:xfrm>
+          <a:off x="6230938" y="2655887"/>
+          <a:ext cx="4754562" cy="1283328"/>
+        </p:xfrm>
+        <a:graphic>
+          <a:graphicData uri="http://schemas.openxmlformats.org/drawingml/2006/table">
+            <a:tbl>
+              <a:tblPr bandRow="1">
+                <a:tableStyleId>{5C22544A-7EE6-4342-B048-85BDC9FD1C3A}</a:tableStyleId>
+              </a:tblPr>
+              <a:tblGrid>
+                <a:gridCol w="2377281">
+                  <a:extLst>
+                    <a:ext uri="{9D8B030D-6E8A-4147-A177-3AD203B41FA5}">
+                      <a16:colId xmlns:a16="http://schemas.microsoft.com/office/drawing/2014/main" val="577589525"/>
+                    </a:ext>
+                  </a:extLst>
+                </a:gridCol>
+                <a:gridCol w="2377281">
+                  <a:extLst>
+                    <a:ext uri="{9D8B030D-6E8A-4147-A177-3AD203B41FA5}">
+                      <a16:colId xmlns:a16="http://schemas.microsoft.com/office/drawing/2014/main" val="472015466"/>
+                    </a:ext>
+                  </a:extLst>
+                </a:gridCol>
+              </a:tblGrid>
+              <a:tr h="641664">
+                <a:tc>
+                  <a:txBody>
+                    <a:bodyPr/>
+                    <a:lstStyle/>
+                    <a:p>
+                      <a:pPr marL="0" marR="0" lvl="0" indent="0" algn="l" defTabSz="914400" rtl="0" eaLnBrk="1" fontAlgn="auto" latinLnBrk="0" hangingPunct="1">
+                        <a:lnSpc>
+                          <a:spcPct val="100000"/>
+                        </a:lnSpc>
+                        <a:spcBef>
+                          <a:spcPts val="0"/>
+                        </a:spcBef>
+                        <a:spcAft>
+                          <a:spcPts val="0"/>
+                        </a:spcAft>
+                        <a:buClrTx/>
+                        <a:buSzTx/>
+                        <a:buFontTx/>
+                        <a:buNone/>
+                        <a:tabLst/>
+                        <a:defRPr/>
+                      </a:pPr>
+                      <a:r>
+                        <a:rPr lang="en-US" b="1" dirty="0"/>
+                        <a:t>Operating System</a:t>
+                      </a:r>
+                      <a:endParaRPr lang="en-IN" b="1" dirty="0"/>
+                    </a:p>
+                  </a:txBody>
+                  <a:tcPr anchor="ctr"/>
+                </a:tc>
+                <a:tc>
+                  <a:txBody>
+                    <a:bodyPr/>
+                    <a:lstStyle/>
+                    <a:p>
+                      <a:r>
+                        <a:rPr lang="en-US" dirty="0"/>
+                        <a:t>Windows 7 and above</a:t>
+                      </a:r>
+                      <a:endParaRPr lang="en-IN" dirty="0"/>
+                    </a:p>
+                  </a:txBody>
+                  <a:tcPr anchor="ctr"/>
+                </a:tc>
+                <a:extLst>
+                  <a:ext uri="{0D108BD9-81ED-4DB2-BD59-A6C34878D82A}">
+                    <a16:rowId xmlns:a16="http://schemas.microsoft.com/office/drawing/2014/main" val="767069744"/>
+                  </a:ext>
+                </a:extLst>
+              </a:tr>
+              <a:tr h="641664">
+                <a:tc>
+                  <a:txBody>
+                    <a:bodyPr/>
+                    <a:lstStyle/>
+                    <a:p>
+                      <a:r>
+                        <a:rPr lang="en-US" b="1" dirty="0"/>
+                        <a:t>Browser</a:t>
+                      </a:r>
+                      <a:endParaRPr lang="en-IN" b="1" dirty="0"/>
+                    </a:p>
+                  </a:txBody>
+                  <a:tcPr anchor="ctr"/>
+                </a:tc>
+                <a:tc>
+                  <a:txBody>
+                    <a:bodyPr/>
+                    <a:lstStyle/>
+                    <a:p>
+                      <a:r>
+                        <a:rPr lang="en-US" dirty="0"/>
+                        <a:t>Any Chromium based browser</a:t>
+                      </a:r>
+                      <a:endParaRPr lang="en-IN" dirty="0"/>
+                    </a:p>
+                  </a:txBody>
+                  <a:tcPr anchor="ctr"/>
+                </a:tc>
+                <a:extLst>
+                  <a:ext uri="{0D108BD9-81ED-4DB2-BD59-A6C34878D82A}">
+                    <a16:rowId xmlns:a16="http://schemas.microsoft.com/office/drawing/2014/main" val="4069471647"/>
+                  </a:ext>
+                </a:extLst>
+              </a:tr>
+            </a:tbl>
+          </a:graphicData>
+        </a:graphic>
+      </p:graphicFrame>
+    </p:spTree>
+    <p:extLst>
+      <p:ext uri="{BB962C8B-B14F-4D97-AF65-F5344CB8AC3E}">
+        <p14:creationId xmlns:p14="http://schemas.microsoft.com/office/powerpoint/2010/main" val="610911439"/>
+      </p:ext>
+    </p:extLst>
+  </p:cSld>
+  <p:clrMapOvr>
+    <a:masterClrMapping/>
+  </p:clrMapOvr>
+</p:sld>
+</file>
+
+<file path=ppt/slides/slide6.xml><?xml version="1.0" encoding="utf-8"?>
+<p:sld xmlns:a="http://schemas.openxmlformats.org/drawingml/2006/main" xmlns:r="http://schemas.openxmlformats.org/officeDocument/2006/relationships" xmlns:p="http://schemas.openxmlformats.org/presentationml/2006/main">
+  <p:cSld>
+    <p:spTree>
+      <p:nvGrpSpPr>
+        <p:cNvPr id="1" name=""/>
+        <p:cNvGrpSpPr/>
+        <p:nvPr/>
+      </p:nvGrpSpPr>
+      <p:grpSpPr>
+        <a:xfrm>
+          <a:off x="0" y="0"/>
+          <a:ext cx="0" cy="0"/>
+          <a:chOff x="0" y="0"/>
+          <a:chExt cx="0" cy="0"/>
+        </a:xfrm>
+      </p:grpSpPr>
+      <p:sp>
+        <p:nvSpPr>
+          <p:cNvPr id="2" name="Title 1">
+            <a:extLst>
+              <a:ext uri="{FF2B5EF4-FFF2-40B4-BE49-F238E27FC236}">
+                <a16:creationId xmlns:a16="http://schemas.microsoft.com/office/drawing/2014/main" id="{C87EC814-72DE-4610-A12C-39B3801BEE3D}"/>
+              </a:ext>
+            </a:extLst>
+          </p:cNvPr>
+          <p:cNvSpPr>
+            <a:spLocks noGrp="1"/>
+          </p:cNvSpPr>
+          <p:nvPr>
+            <p:ph type="title"/>
+          </p:nvPr>
+        </p:nvSpPr>
+        <p:spPr/>
+        <p:txBody>
+          <a:bodyPr/>
+          <a:lstStyle/>
+          <a:p>
+            <a:r>
+              <a:rPr lang="en-US" dirty="0"/>
+              <a:t>Development Environment</a:t>
+            </a:r>
+            <a:endParaRPr lang="en-IN" dirty="0"/>
+          </a:p>
+        </p:txBody>
+      </p:sp>
+      <p:sp>
+        <p:nvSpPr>
+          <p:cNvPr id="3" name="Text Placeholder 2">
+            <a:extLst>
+              <a:ext uri="{FF2B5EF4-FFF2-40B4-BE49-F238E27FC236}">
+                <a16:creationId xmlns:a16="http://schemas.microsoft.com/office/drawing/2014/main" id="{ED4784C0-08BC-4D8C-AE98-D1B476150B7E}"/>
+              </a:ext>
+            </a:extLst>
+          </p:cNvPr>
+          <p:cNvSpPr>
+            <a:spLocks noGrp="1"/>
+          </p:cNvSpPr>
+          <p:nvPr>
+            <p:ph type="body" idx="1"/>
+          </p:nvPr>
+        </p:nvSpPr>
+        <p:spPr>
+          <a:xfrm>
+            <a:off x="1207008" y="1913470"/>
+            <a:ext cx="4753762" cy="743094"/>
+          </a:xfrm>
+        </p:spPr>
+        <p:txBody>
+          <a:bodyPr/>
+          <a:lstStyle/>
+          <a:p>
+            <a:r>
+              <a:rPr lang="en-US" dirty="0"/>
+              <a:t>H/W</a:t>
+            </a:r>
+            <a:endParaRPr lang="en-IN" dirty="0"/>
+          </a:p>
+        </p:txBody>
+      </p:sp>
+      <p:graphicFrame>
+        <p:nvGraphicFramePr>
+          <p:cNvPr id="7" name="Table 7">
+            <a:extLst>
+              <a:ext uri="{FF2B5EF4-FFF2-40B4-BE49-F238E27FC236}">
+                <a16:creationId xmlns:a16="http://schemas.microsoft.com/office/drawing/2014/main" id="{65879DAB-0D71-443A-BA73-40037AEBF5B0}"/>
+              </a:ext>
+            </a:extLst>
+          </p:cNvPr>
+          <p:cNvGraphicFramePr>
+            <a:graphicFrameLocks noGrp="1"/>
+          </p:cNvGraphicFramePr>
+          <p:nvPr>
+            <p:ph sz="half" idx="2"/>
+            <p:extLst>
+              <p:ext uri="{D42A27DB-BD31-4B8C-83A1-F6EECF244321}">
+                <p14:modId xmlns:p14="http://schemas.microsoft.com/office/powerpoint/2010/main" val="1740641140"/>
+              </p:ext>
+            </p:extLst>
+          </p:nvPr>
+        </p:nvGraphicFramePr>
+        <p:xfrm>
+          <a:off x="1206500" y="2655887"/>
+          <a:ext cx="4753762" cy="1924992"/>
+        </p:xfrm>
+        <a:graphic>
+          <a:graphicData uri="http://schemas.openxmlformats.org/drawingml/2006/table">
+            <a:tbl>
+              <a:tblPr bandRow="1">
+                <a:tableStyleId>{5C22544A-7EE6-4342-B048-85BDC9FD1C3A}</a:tableStyleId>
+              </a:tblPr>
+              <a:tblGrid>
+                <a:gridCol w="2376881">
+                  <a:extLst>
+                    <a:ext uri="{9D8B030D-6E8A-4147-A177-3AD203B41FA5}">
+                      <a16:colId xmlns:a16="http://schemas.microsoft.com/office/drawing/2014/main" val="3552138136"/>
+                    </a:ext>
+                  </a:extLst>
+                </a:gridCol>
+                <a:gridCol w="2376881">
+                  <a:extLst>
+                    <a:ext uri="{9D8B030D-6E8A-4147-A177-3AD203B41FA5}">
+                      <a16:colId xmlns:a16="http://schemas.microsoft.com/office/drawing/2014/main" val="4267389227"/>
+                    </a:ext>
+                  </a:extLst>
+                </a:gridCol>
+              </a:tblGrid>
+              <a:tr h="641664">
+                <a:tc>
+                  <a:txBody>
+                    <a:bodyPr/>
+                    <a:lstStyle/>
+                    <a:p>
+                      <a:r>
+                        <a:rPr lang="en-US" b="1" dirty="0"/>
+                        <a:t>Processor</a:t>
+                      </a:r>
+                      <a:endParaRPr lang="en-IN" b="1" dirty="0"/>
+                    </a:p>
+                  </a:txBody>
+                  <a:tcPr anchor="ctr"/>
+                </a:tc>
+                <a:tc>
+                  <a:txBody>
+                    <a:bodyPr/>
+                    <a:lstStyle/>
+                    <a:p>
+                      <a:r>
+                        <a:rPr lang="en-US" dirty="0"/>
+                        <a:t>Ryzen 5 3550H</a:t>
+                      </a:r>
+                      <a:endParaRPr lang="en-IN" dirty="0"/>
+                    </a:p>
+                  </a:txBody>
+                  <a:tcPr anchor="ctr"/>
+                </a:tc>
+                <a:extLst>
+                  <a:ext uri="{0D108BD9-81ED-4DB2-BD59-A6C34878D82A}">
+                    <a16:rowId xmlns:a16="http://schemas.microsoft.com/office/drawing/2014/main" val="1089670808"/>
+                  </a:ext>
+                </a:extLst>
+              </a:tr>
+              <a:tr h="641664">
+                <a:tc>
+                  <a:txBody>
+                    <a:bodyPr/>
+                    <a:lstStyle/>
+                    <a:p>
+                      <a:r>
+                        <a:rPr lang="en-US" b="1" dirty="0"/>
+                        <a:t>Memory</a:t>
+                      </a:r>
+                      <a:endParaRPr lang="en-IN" b="1" dirty="0"/>
+                    </a:p>
+                  </a:txBody>
+                  <a:tcPr anchor="ctr"/>
+                </a:tc>
+                <a:tc>
+                  <a:txBody>
+                    <a:bodyPr/>
+                    <a:lstStyle/>
+                    <a:p>
+                      <a:r>
+                        <a:rPr lang="en-US" dirty="0"/>
+                        <a:t>8 GB</a:t>
+                      </a:r>
+                      <a:endParaRPr lang="en-IN" dirty="0"/>
+                    </a:p>
+                  </a:txBody>
+                  <a:tcPr anchor="ctr"/>
+                </a:tc>
+                <a:extLst>
+                  <a:ext uri="{0D108BD9-81ED-4DB2-BD59-A6C34878D82A}">
+                    <a16:rowId xmlns:a16="http://schemas.microsoft.com/office/drawing/2014/main" val="1782672493"/>
+                  </a:ext>
+                </a:extLst>
+              </a:tr>
+              <a:tr h="641664">
+                <a:tc>
+                  <a:txBody>
+                    <a:bodyPr/>
+                    <a:lstStyle/>
+                    <a:p>
+                      <a:r>
+                        <a:rPr lang="en-US" b="1" dirty="0"/>
+                        <a:t>Storage</a:t>
+                      </a:r>
+                      <a:endParaRPr lang="en-IN" b="1" dirty="0"/>
+                    </a:p>
+                  </a:txBody>
+                  <a:tcPr anchor="ctr"/>
+                </a:tc>
+                <a:tc>
+                  <a:txBody>
+                    <a:bodyPr/>
+                    <a:lstStyle/>
+                    <a:p>
+                      <a:r>
+                        <a:rPr lang="en-US" dirty="0"/>
+                        <a:t>256 GB</a:t>
+                      </a:r>
+                      <a:endParaRPr lang="en-IN" dirty="0"/>
+                    </a:p>
+                  </a:txBody>
+                  <a:tcPr anchor="ctr"/>
+                </a:tc>
+                <a:extLst>
+                  <a:ext uri="{0D108BD9-81ED-4DB2-BD59-A6C34878D82A}">
+                    <a16:rowId xmlns:a16="http://schemas.microsoft.com/office/drawing/2014/main" val="680929299"/>
+                  </a:ext>
+                </a:extLst>
+              </a:tr>
+            </a:tbl>
+          </a:graphicData>
+        </a:graphic>
+      </p:graphicFrame>
+      <p:sp>
+        <p:nvSpPr>
+          <p:cNvPr id="5" name="Text Placeholder 4">
+            <a:extLst>
+              <a:ext uri="{FF2B5EF4-FFF2-40B4-BE49-F238E27FC236}">
+                <a16:creationId xmlns:a16="http://schemas.microsoft.com/office/drawing/2014/main" id="{766C832C-3C20-4A0D-AE5B-DCA165C88936}"/>
+              </a:ext>
+            </a:extLst>
+          </p:cNvPr>
+          <p:cNvSpPr>
+            <a:spLocks noGrp="1"/>
+          </p:cNvSpPr>
+          <p:nvPr>
+            <p:ph type="body" sz="quarter" idx="3"/>
+          </p:nvPr>
+        </p:nvSpPr>
+        <p:spPr>
+          <a:xfrm>
+            <a:off x="6231230" y="1913470"/>
+            <a:ext cx="4753762" cy="743094"/>
+          </a:xfrm>
+        </p:spPr>
+        <p:txBody>
+          <a:bodyPr/>
+          <a:lstStyle/>
+          <a:p>
+            <a:r>
+              <a:rPr lang="en-US" dirty="0"/>
+              <a:t>S/W</a:t>
+            </a:r>
+            <a:endParaRPr lang="en-IN" dirty="0"/>
+          </a:p>
+        </p:txBody>
+      </p:sp>
+      <p:graphicFrame>
+        <p:nvGraphicFramePr>
+          <p:cNvPr id="8" name="Table 8">
+            <a:extLst>
+              <a:ext uri="{FF2B5EF4-FFF2-40B4-BE49-F238E27FC236}">
+                <a16:creationId xmlns:a16="http://schemas.microsoft.com/office/drawing/2014/main" id="{3F59B530-71F9-4946-A1A8-729A632A8644}"/>
+              </a:ext>
+            </a:extLst>
+          </p:cNvPr>
+          <p:cNvGraphicFramePr>
+            <a:graphicFrameLocks noGrp="1"/>
+          </p:cNvGraphicFramePr>
+          <p:nvPr>
+            <p:ph sz="quarter" idx="4"/>
+            <p:extLst>
+              <p:ext uri="{D42A27DB-BD31-4B8C-83A1-F6EECF244321}">
+                <p14:modId xmlns:p14="http://schemas.microsoft.com/office/powerpoint/2010/main" val="2818533011"/>
+              </p:ext>
+            </p:extLst>
+          </p:nvPr>
+        </p:nvGraphicFramePr>
+        <p:xfrm>
+          <a:off x="6230938" y="2655887"/>
+          <a:ext cx="4754562" cy="3372054"/>
+        </p:xfrm>
+        <a:graphic>
+          <a:graphicData uri="http://schemas.openxmlformats.org/drawingml/2006/table">
+            <a:tbl>
+              <a:tblPr bandRow="1">
+                <a:tableStyleId>{5C22544A-7EE6-4342-B048-85BDC9FD1C3A}</a:tableStyleId>
+              </a:tblPr>
+              <a:tblGrid>
+                <a:gridCol w="2377281">
+                  <a:extLst>
+                    <a:ext uri="{9D8B030D-6E8A-4147-A177-3AD203B41FA5}">
+                      <a16:colId xmlns:a16="http://schemas.microsoft.com/office/drawing/2014/main" val="577589525"/>
+                    </a:ext>
+                  </a:extLst>
+                </a:gridCol>
+                <a:gridCol w="2377281">
+                  <a:extLst>
+                    <a:ext uri="{9D8B030D-6E8A-4147-A177-3AD203B41FA5}">
+                      <a16:colId xmlns:a16="http://schemas.microsoft.com/office/drawing/2014/main" val="472015466"/>
+                    </a:ext>
+                  </a:extLst>
+                </a:gridCol>
+              </a:tblGrid>
+              <a:tr h="481722">
+                <a:tc>
+                  <a:txBody>
+                    <a:bodyPr/>
+                    <a:lstStyle/>
+                    <a:p>
+                      <a:r>
+                        <a:rPr lang="en-US" b="1" dirty="0"/>
+                        <a:t>Operating System</a:t>
+                      </a:r>
+                      <a:endParaRPr lang="en-IN" b="1" dirty="0"/>
+                    </a:p>
+                  </a:txBody>
+                  <a:tcPr anchor="ctr"/>
+                </a:tc>
+                <a:tc>
+                  <a:txBody>
+                    <a:bodyPr/>
+                    <a:lstStyle/>
+                    <a:p>
+                      <a:r>
+                        <a:rPr lang="en-US" dirty="0"/>
+                        <a:t>Windows 10/11</a:t>
+                      </a:r>
+                      <a:endParaRPr lang="en-IN" dirty="0"/>
+                    </a:p>
+                  </a:txBody>
+                  <a:tcPr anchor="ctr"/>
+                </a:tc>
+                <a:extLst>
+                  <a:ext uri="{0D108BD9-81ED-4DB2-BD59-A6C34878D82A}">
+                    <a16:rowId xmlns:a16="http://schemas.microsoft.com/office/drawing/2014/main" val="767069744"/>
+                  </a:ext>
+                </a:extLst>
+              </a:tr>
+              <a:tr h="481722">
+                <a:tc>
+                  <a:txBody>
+                    <a:bodyPr/>
+                    <a:lstStyle/>
+                    <a:p>
+                      <a:r>
+                        <a:rPr lang="en-US" b="1" dirty="0"/>
+                        <a:t>WAMP</a:t>
+                      </a:r>
+                      <a:endParaRPr lang="en-IN" b="1" dirty="0"/>
+                    </a:p>
+                  </a:txBody>
+                  <a:tcPr anchor="ctr"/>
+                </a:tc>
+                <a:tc>
+                  <a:txBody>
+                    <a:bodyPr/>
+                    <a:lstStyle/>
+                    <a:p>
+                      <a:r>
+                        <a:rPr lang="en-US" dirty="0"/>
+                        <a:t>V 4.1</a:t>
+                      </a:r>
+                      <a:endParaRPr lang="en-IN" dirty="0"/>
+                    </a:p>
+                  </a:txBody>
+                  <a:tcPr anchor="ctr"/>
+                </a:tc>
+                <a:extLst>
+                  <a:ext uri="{0D108BD9-81ED-4DB2-BD59-A6C34878D82A}">
+                    <a16:rowId xmlns:a16="http://schemas.microsoft.com/office/drawing/2014/main" val="4069471647"/>
+                  </a:ext>
+                </a:extLst>
+              </a:tr>
+              <a:tr h="481722">
+                <a:tc>
+                  <a:txBody>
+                    <a:bodyPr/>
+                    <a:lstStyle/>
+                    <a:p>
+                      <a:r>
+                        <a:rPr lang="en-US" b="1" dirty="0"/>
+                        <a:t>Chrome</a:t>
+                      </a:r>
+                      <a:endParaRPr lang="en-IN" b="1" dirty="0"/>
+                    </a:p>
+                  </a:txBody>
+                  <a:tcPr anchor="ctr"/>
+                </a:tc>
+                <a:tc>
+                  <a:txBody>
+                    <a:bodyPr/>
+                    <a:lstStyle/>
+                    <a:p>
+                      <a:r>
+                        <a:rPr lang="en-US" dirty="0"/>
+                        <a:t>V 99.0.4</a:t>
+                      </a:r>
+                      <a:endParaRPr lang="en-IN" dirty="0"/>
+                    </a:p>
+                  </a:txBody>
+                  <a:tcPr anchor="ctr"/>
+                </a:tc>
+                <a:extLst>
+                  <a:ext uri="{0D108BD9-81ED-4DB2-BD59-A6C34878D82A}">
+                    <a16:rowId xmlns:a16="http://schemas.microsoft.com/office/drawing/2014/main" val="1261525462"/>
+                  </a:ext>
+                </a:extLst>
+              </a:tr>
+              <a:tr h="481722">
+                <a:tc>
+                  <a:txBody>
+                    <a:bodyPr/>
+                    <a:lstStyle/>
+                    <a:p>
+                      <a:r>
+                        <a:rPr lang="en-US" b="1" dirty="0"/>
+                        <a:t>Git</a:t>
+                      </a:r>
+                      <a:endParaRPr lang="en-IN" b="1" dirty="0"/>
+                    </a:p>
+                  </a:txBody>
+                  <a:tcPr anchor="ctr"/>
+                </a:tc>
+                <a:tc>
+                  <a:txBody>
+                    <a:bodyPr/>
+                    <a:lstStyle/>
+                    <a:p>
+                      <a:r>
+                        <a:rPr lang="en-US" dirty="0"/>
+                        <a:t>V 2.34.1</a:t>
+                      </a:r>
+                      <a:endParaRPr lang="en-IN" dirty="0"/>
+                    </a:p>
+                  </a:txBody>
+                  <a:tcPr anchor="ctr"/>
+                </a:tc>
+                <a:extLst>
+                  <a:ext uri="{0D108BD9-81ED-4DB2-BD59-A6C34878D82A}">
+                    <a16:rowId xmlns:a16="http://schemas.microsoft.com/office/drawing/2014/main" val="3313380033"/>
+                  </a:ext>
+                </a:extLst>
+              </a:tr>
+              <a:tr h="481722">
+                <a:tc>
+                  <a:txBody>
+                    <a:bodyPr/>
+                    <a:lstStyle/>
+                    <a:p>
+                      <a:r>
+                        <a:rPr lang="en-US" b="1" dirty="0"/>
+                        <a:t>Composer</a:t>
+                      </a:r>
+                      <a:endParaRPr lang="en-IN" b="1" dirty="0"/>
+                    </a:p>
+                  </a:txBody>
+                  <a:tcPr anchor="ctr"/>
+                </a:tc>
+                <a:tc>
+                  <a:txBody>
+                    <a:bodyPr/>
+                    <a:lstStyle/>
+                    <a:p>
+                      <a:r>
+                        <a:rPr lang="en-US" dirty="0"/>
+                        <a:t>V 2.2.3</a:t>
+                      </a:r>
+                      <a:endParaRPr lang="en-IN" dirty="0"/>
+                    </a:p>
+                  </a:txBody>
+                  <a:tcPr anchor="ctr"/>
+                </a:tc>
+                <a:extLst>
+                  <a:ext uri="{0D108BD9-81ED-4DB2-BD59-A6C34878D82A}">
+                    <a16:rowId xmlns:a16="http://schemas.microsoft.com/office/drawing/2014/main" val="3943228938"/>
+                  </a:ext>
+                </a:extLst>
+              </a:tr>
+              <a:tr h="481722">
+                <a:tc>
+                  <a:txBody>
+                    <a:bodyPr/>
+                    <a:lstStyle/>
+                    <a:p>
+                      <a:r>
+                        <a:rPr lang="en-US" b="1" dirty="0"/>
+                        <a:t>VS Code</a:t>
+                      </a:r>
+                      <a:endParaRPr lang="en-IN" b="1" dirty="0"/>
+                    </a:p>
+                  </a:txBody>
+                  <a:tcPr anchor="ctr"/>
+                </a:tc>
+                <a:tc>
+                  <a:txBody>
+                    <a:bodyPr/>
+                    <a:lstStyle/>
+                    <a:p>
+                      <a:r>
+                        <a:rPr lang="en-US" dirty="0"/>
+                        <a:t>V 1.50^</a:t>
+                      </a:r>
+                      <a:endParaRPr lang="en-IN" dirty="0"/>
+                    </a:p>
+                  </a:txBody>
+                  <a:tcPr anchor="ctr"/>
+                </a:tc>
+                <a:extLst>
+                  <a:ext uri="{0D108BD9-81ED-4DB2-BD59-A6C34878D82A}">
+                    <a16:rowId xmlns:a16="http://schemas.microsoft.com/office/drawing/2014/main" val="2850244408"/>
+                  </a:ext>
+                </a:extLst>
+              </a:tr>
+              <a:tr h="481722">
+                <a:tc>
+                  <a:txBody>
+                    <a:bodyPr/>
+                    <a:lstStyle/>
+                    <a:p>
+                      <a:r>
+                        <a:rPr lang="en-US" b="1" dirty="0"/>
+                        <a:t>Diagrams.net</a:t>
+                      </a:r>
+                      <a:endParaRPr lang="en-IN" b="1" dirty="0"/>
+                    </a:p>
+                  </a:txBody>
+                  <a:tcPr anchor="ctr"/>
+                </a:tc>
+                <a:tc>
+                  <a:txBody>
+                    <a:bodyPr/>
+                    <a:lstStyle/>
+                    <a:p>
+                      <a:r>
+                        <a:rPr lang="en-US" dirty="0"/>
+                        <a:t>V 17.2.3</a:t>
+                      </a:r>
+                      <a:endParaRPr lang="en-IN" dirty="0"/>
+                    </a:p>
+                  </a:txBody>
+                  <a:tcPr anchor="ctr"/>
+                </a:tc>
+                <a:extLst>
+                  <a:ext uri="{0D108BD9-81ED-4DB2-BD59-A6C34878D82A}">
+                    <a16:rowId xmlns:a16="http://schemas.microsoft.com/office/drawing/2014/main" val="3938224502"/>
+                  </a:ext>
+                </a:extLst>
+              </a:tr>
+            </a:tbl>
+          </a:graphicData>
+        </a:graphic>
+      </p:graphicFrame>
+    </p:spTree>
+    <p:extLst>
+      <p:ext uri="{BB962C8B-B14F-4D97-AF65-F5344CB8AC3E}">
+        <p14:creationId xmlns:p14="http://schemas.microsoft.com/office/powerpoint/2010/main" val="1069679122"/>
+      </p:ext>
+    </p:extLst>
+  </p:cSld>
+  <p:clrMapOvr>
+    <a:masterClrMapping/>
+  </p:clrMapOvr>
+</p:sld>
+</file>
+
+<file path=ppt/slides/slide7.xml><?xml version="1.0" encoding="utf-8"?>
+<p:sld xmlns:a="http://schemas.openxmlformats.org/drawingml/2006/main" xmlns:r="http://schemas.openxmlformats.org/officeDocument/2006/relationships" xmlns:p="http://schemas.openxmlformats.org/presentationml/2006/main">
+  <p:cSld>
+    <p:spTree>
+      <p:nvGrpSpPr>
+        <p:cNvPr id="1" name=""/>
+        <p:cNvGrpSpPr/>
+        <p:nvPr/>
+      </p:nvGrpSpPr>
+      <p:grpSpPr>
+        <a:xfrm>
+          <a:off x="0" y="0"/>
+          <a:ext cx="0" cy="0"/>
+          <a:chOff x="0" y="0"/>
+          <a:chExt cx="0" cy="0"/>
+        </a:xfrm>
+      </p:grpSpPr>
+      <p:sp>
+        <p:nvSpPr>
+          <p:cNvPr id="2" name="Title 1">
+            <a:extLst>
+              <a:ext uri="{FF2B5EF4-FFF2-40B4-BE49-F238E27FC236}">
+                <a16:creationId xmlns:a16="http://schemas.microsoft.com/office/drawing/2014/main" id="{CBDB79BA-955C-4620-A903-62B52DFCAC49}"/>
+              </a:ext>
+            </a:extLst>
+          </p:cNvPr>
+          <p:cNvSpPr>
+            <a:spLocks noGrp="1"/>
+          </p:cNvSpPr>
+          <p:nvPr>
+            <p:ph type="title"/>
+          </p:nvPr>
+        </p:nvSpPr>
+        <p:spPr/>
+        <p:txBody>
+          <a:bodyPr/>
+          <a:lstStyle/>
+          <a:p>
+            <a:r>
+              <a:rPr lang="en-US" dirty="0"/>
+              <a:t>Technologies used</a:t>
+            </a:r>
+            <a:endParaRPr lang="en-IN" dirty="0"/>
+          </a:p>
+        </p:txBody>
+      </p:sp>
+      <p:sp>
+        <p:nvSpPr>
+          <p:cNvPr id="3" name="Content Placeholder 2">
+            <a:extLst>
+              <a:ext uri="{FF2B5EF4-FFF2-40B4-BE49-F238E27FC236}">
+                <a16:creationId xmlns:a16="http://schemas.microsoft.com/office/drawing/2014/main" id="{F05FFBF3-D802-4A5E-970F-E76A8F6FA884}"/>
+              </a:ext>
+            </a:extLst>
+          </p:cNvPr>
+          <p:cNvSpPr>
+            <a:spLocks noGrp="1"/>
+          </p:cNvSpPr>
+          <p:nvPr>
+            <p:ph idx="1"/>
+          </p:nvPr>
+        </p:nvSpPr>
+        <p:spPr/>
+        <p:txBody>
+          <a:bodyPr/>
+          <a:lstStyle/>
+          <a:p>
+            <a:r>
+              <a:rPr lang="en-US" dirty="0"/>
+              <a:t>PHP</a:t>
+            </a:r>
+          </a:p>
+          <a:p>
+            <a:r>
+              <a:rPr lang="en-US" dirty="0"/>
+              <a:t>MySQL</a:t>
+            </a:r>
+          </a:p>
+          <a:p>
+            <a:r>
+              <a:rPr lang="en-US" dirty="0"/>
+              <a:t>MVC</a:t>
+            </a:r>
+          </a:p>
+          <a:p>
+            <a:r>
+              <a:rPr lang="en-US" dirty="0"/>
+              <a:t>Laravel v8</a:t>
+            </a:r>
+          </a:p>
+          <a:p>
+            <a:r>
+              <a:rPr lang="en-US" dirty="0"/>
+              <a:t>Bootstrap</a:t>
+            </a:r>
+          </a:p>
+          <a:p>
+            <a:r>
+              <a:rPr lang="en-US" dirty="0"/>
+              <a:t>JQuery</a:t>
+            </a:r>
+          </a:p>
+          <a:p>
+            <a:r>
+              <a:rPr lang="en-US" dirty="0"/>
+              <a:t>Composer</a:t>
+            </a:r>
+          </a:p>
+          <a:p>
+            <a:endParaRPr lang="en-US" dirty="0"/>
+          </a:p>
+          <a:p>
+            <a:endParaRPr lang="en-IN" dirty="0"/>
+          </a:p>
+        </p:txBody>
+      </p:sp>
+    </p:spTree>
+    <p:extLst>
+      <p:ext uri="{BB962C8B-B14F-4D97-AF65-F5344CB8AC3E}">
+        <p14:creationId xmlns:p14="http://schemas.microsoft.com/office/powerpoint/2010/main" val="280191366"/>
+      </p:ext>
+    </p:extLst>
+  </p:cSld>
+  <p:clrMapOvr>
+    <a:masterClrMapping/>
+  </p:clrMapOvr>
+</p:sld>
+</file>
+
+<file path=ppt/slides/slide8.xml><?xml version="1.0" encoding="utf-8"?>
+<p:sld xmlns:a="http://schemas.openxmlformats.org/drawingml/2006/main" xmlns:r="http://schemas.openxmlformats.org/officeDocument/2006/relationships" xmlns:p="http://schemas.openxmlformats.org/presentationml/2006/main">
+  <p:cSld>
+    <p:spTree>
+      <p:nvGrpSpPr>
+        <p:cNvPr id="1" name=""/>
+        <p:cNvGrpSpPr/>
+        <p:nvPr/>
+      </p:nvGrpSpPr>
+      <p:grpSpPr>
+        <a:xfrm>
+          <a:off x="0" y="0"/>
+          <a:ext cx="0" cy="0"/>
+          <a:chOff x="0" y="0"/>
+          <a:chExt cx="0" cy="0"/>
+        </a:xfrm>
+      </p:grpSpPr>
+      <p:sp>
+        <p:nvSpPr>
+          <p:cNvPr id="2" name="Title 1">
+            <a:extLst>
+              <a:ext uri="{FF2B5EF4-FFF2-40B4-BE49-F238E27FC236}">
+                <a16:creationId xmlns:a16="http://schemas.microsoft.com/office/drawing/2014/main" id="{991E0F8E-E4DE-4F7C-A7D9-9D843C8279A2}"/>
+              </a:ext>
+            </a:extLst>
+          </p:cNvPr>
+          <p:cNvSpPr>
+            <a:spLocks noGrp="1"/>
+          </p:cNvSpPr>
+          <p:nvPr>
+            <p:ph type="title"/>
+          </p:nvPr>
+        </p:nvSpPr>
+        <p:spPr/>
+        <p:txBody>
+          <a:bodyPr/>
+          <a:lstStyle/>
+          <a:p>
+            <a:r>
+              <a:rPr lang="en-US" dirty="0"/>
+              <a:t>User requirements</a:t>
+            </a:r>
+            <a:endParaRPr lang="en-IN" dirty="0"/>
+          </a:p>
+        </p:txBody>
+      </p:sp>
+      <p:sp>
+        <p:nvSpPr>
+          <p:cNvPr id="3" name="Content Placeholder 2">
+            <a:extLst>
+              <a:ext uri="{FF2B5EF4-FFF2-40B4-BE49-F238E27FC236}">
+                <a16:creationId xmlns:a16="http://schemas.microsoft.com/office/drawing/2014/main" id="{F9F750B9-F369-4E38-9582-A3747D8A95DA}"/>
+              </a:ext>
+            </a:extLst>
+          </p:cNvPr>
+          <p:cNvSpPr>
+            <a:spLocks noGrp="1"/>
+          </p:cNvSpPr>
+          <p:nvPr>
+            <p:ph idx="1"/>
+          </p:nvPr>
+        </p:nvSpPr>
+        <p:spPr/>
+        <p:txBody>
+          <a:bodyPr/>
+          <a:lstStyle/>
+          <a:p>
+            <a:r>
+              <a:rPr lang="en-US" dirty="0"/>
+              <a:t>Users are registered users whom have signed up in website. New Users have default type ‘U’.</a:t>
+            </a:r>
+          </a:p>
+          <a:p>
+            <a:r>
+              <a:rPr lang="en-IN" dirty="0"/>
+              <a:t>Login</a:t>
+            </a:r>
+            <a:endParaRPr lang="en-US" dirty="0"/>
+          </a:p>
+          <a:p>
+            <a:r>
+              <a:rPr lang="en-IN" dirty="0"/>
+              <a:t>Signup</a:t>
+            </a:r>
+            <a:endParaRPr lang="en-US" dirty="0"/>
+          </a:p>
+          <a:p>
+            <a:r>
+              <a:rPr lang="en-IN" dirty="0"/>
+              <a:t>Logout</a:t>
+            </a:r>
+            <a:endParaRPr lang="en-US" dirty="0"/>
+          </a:p>
+          <a:p>
+            <a:r>
+              <a:rPr lang="en-IN" dirty="0"/>
+              <a:t>User Profile</a:t>
+            </a:r>
+            <a:endParaRPr lang="en-US" dirty="0"/>
+          </a:p>
+          <a:p>
+            <a:r>
+              <a:rPr lang="en-IN" dirty="0"/>
+              <a:t>Change Password</a:t>
+            </a:r>
+            <a:endParaRPr lang="en-US" dirty="0"/>
+          </a:p>
+          <a:p>
+            <a:r>
+              <a:rPr lang="en-IN" dirty="0"/>
+              <a:t>Save/Bookmark Property</a:t>
+            </a:r>
+          </a:p>
+          <a:p>
+            <a:r>
+              <a:rPr lang="en-IN" dirty="0"/>
+              <a:t>Review</a:t>
+            </a:r>
+          </a:p>
+        </p:txBody>
+      </p:sp>
+    </p:spTree>
+    <p:extLst>
+      <p:ext uri="{BB962C8B-B14F-4D97-AF65-F5344CB8AC3E}">
+        <p14:creationId xmlns:p14="http://schemas.microsoft.com/office/powerpoint/2010/main" val="1500393840"/>
+      </p:ext>
+    </p:extLst>
+  </p:cSld>
+  <p:clrMapOvr>
+    <a:masterClrMapping/>
+  </p:clrMapOvr>
+</p:sld>
+</file>
+
+<file path=ppt/slides/slide9.xml><?xml version="1.0" encoding="utf-8"?>
+<p:sld xmlns:a="http://schemas.openxmlformats.org/drawingml/2006/main" xmlns:r="http://schemas.openxmlformats.org/officeDocument/2006/relationships" xmlns:p="http://schemas.openxmlformats.org/presentationml/2006/main">
+  <p:cSld>
+    <p:spTree>
+      <p:nvGrpSpPr>
+        <p:cNvPr id="1" name=""/>
+        <p:cNvGrpSpPr/>
+        <p:nvPr/>
+      </p:nvGrpSpPr>
+      <p:grpSpPr>
+        <a:xfrm>
+          <a:off x="0" y="0"/>
+          <a:ext cx="0" cy="0"/>
+          <a:chOff x="0" y="0"/>
+          <a:chExt cx="0" cy="0"/>
+        </a:xfrm>
+      </p:grpSpPr>
+      <p:sp>
+        <p:nvSpPr>
+          <p:cNvPr id="2" name="Title 1">
+            <a:extLst>
+              <a:ext uri="{FF2B5EF4-FFF2-40B4-BE49-F238E27FC236}">
+                <a16:creationId xmlns:a16="http://schemas.microsoft.com/office/drawing/2014/main" id="{991E0F8E-E4DE-4F7C-A7D9-9D843C8279A2}"/>
+              </a:ext>
+            </a:extLst>
+          </p:cNvPr>
+          <p:cNvSpPr>
+            <a:spLocks noGrp="1"/>
+          </p:cNvSpPr>
+          <p:nvPr>
+            <p:ph type="title"/>
+          </p:nvPr>
+        </p:nvSpPr>
+        <p:spPr/>
+        <p:txBody>
+          <a:bodyPr/>
+          <a:lstStyle/>
+          <a:p>
+            <a:r>
+              <a:rPr lang="en-US" dirty="0"/>
+              <a:t>Admin requirements</a:t>
+            </a:r>
+            <a:endParaRPr lang="en-IN" dirty="0"/>
+          </a:p>
+        </p:txBody>
+      </p:sp>
+      <p:sp>
+        <p:nvSpPr>
+          <p:cNvPr id="3" name="Content Placeholder 2">
+            <a:extLst>
+              <a:ext uri="{FF2B5EF4-FFF2-40B4-BE49-F238E27FC236}">
+                <a16:creationId xmlns:a16="http://schemas.microsoft.com/office/drawing/2014/main" id="{F9F750B9-F369-4E38-9582-A3747D8A95DA}"/>
+              </a:ext>
+            </a:extLst>
+          </p:cNvPr>
+          <p:cNvSpPr>
+            <a:spLocks noGrp="1"/>
+          </p:cNvSpPr>
+          <p:nvPr>
+            <p:ph sz="half" idx="1"/>
+          </p:nvPr>
+        </p:nvSpPr>
+        <p:spPr/>
+        <p:txBody>
+          <a:bodyPr>
+            <a:normAutofit/>
+          </a:bodyPr>
+          <a:lstStyle/>
+          <a:p>
+            <a:r>
+              <a:rPr lang="en-US" dirty="0"/>
+              <a:t>User who is type ‘A’ is considered Admin.</a:t>
+            </a:r>
+          </a:p>
+          <a:p>
+            <a:r>
+              <a:rPr lang="en-IN" dirty="0"/>
+              <a:t>Login</a:t>
+            </a:r>
+            <a:endParaRPr lang="en-US" dirty="0"/>
+          </a:p>
+          <a:p>
+            <a:r>
+              <a:rPr lang="en-IN" dirty="0"/>
+              <a:t>Logout</a:t>
+            </a:r>
+            <a:endParaRPr lang="en-US" dirty="0"/>
+          </a:p>
+          <a:p>
+            <a:r>
+              <a:rPr lang="en-IN" dirty="0"/>
+              <a:t>Category</a:t>
+            </a:r>
+          </a:p>
+          <a:p>
+            <a:r>
+              <a:rPr lang="en-IN" dirty="0"/>
+              <a:t>City</a:t>
+            </a:r>
+          </a:p>
+          <a:p>
+            <a:r>
+              <a:rPr lang="en-IN" dirty="0"/>
+              <a:t>Facility</a:t>
+            </a:r>
+          </a:p>
+          <a:p>
+            <a:r>
+              <a:rPr lang="en-IN" dirty="0"/>
+              <a:t>Property</a:t>
+            </a:r>
+          </a:p>
+        </p:txBody>
+      </p:sp>
+      <p:sp>
+        <p:nvSpPr>
+          <p:cNvPr id="4" name="Content Placeholder 3">
+            <a:extLst>
+              <a:ext uri="{FF2B5EF4-FFF2-40B4-BE49-F238E27FC236}">
+                <a16:creationId xmlns:a16="http://schemas.microsoft.com/office/drawing/2014/main" id="{8BCBDA91-F290-4CDF-AEB5-44357056D148}"/>
+              </a:ext>
+            </a:extLst>
+          </p:cNvPr>
+          <p:cNvSpPr>
+            <a:spLocks noGrp="1"/>
+          </p:cNvSpPr>
+          <p:nvPr>
+            <p:ph sz="half" idx="2"/>
+          </p:nvPr>
+        </p:nvSpPr>
+        <p:spPr/>
+        <p:txBody>
+          <a:bodyPr/>
+          <a:lstStyle/>
+          <a:p>
+            <a:r>
+              <a:rPr lang="en-IN" dirty="0"/>
+              <a:t>Gallery</a:t>
+            </a:r>
+          </a:p>
+          <a:p>
+            <a:r>
+              <a:rPr lang="en-IN" dirty="0"/>
+              <a:t>Reviews</a:t>
+            </a:r>
+          </a:p>
+          <a:p>
+            <a:r>
+              <a:rPr lang="en-IN" dirty="0"/>
+              <a:t>Users</a:t>
+            </a:r>
+          </a:p>
+          <a:p>
+            <a:r>
+              <a:rPr lang="en-IN" dirty="0"/>
+              <a:t>Change Password</a:t>
+            </a:r>
+            <a:endParaRPr lang="en-US" dirty="0"/>
+          </a:p>
+          <a:p>
+            <a:r>
+              <a:rPr lang="en-IN" dirty="0"/>
+              <a:t>Save/Bookmark Property</a:t>
+            </a:r>
+          </a:p>
+          <a:p>
+            <a:r>
+              <a:rPr lang="en-IN" dirty="0"/>
+              <a:t>Review</a:t>
+            </a:r>
+          </a:p>
+          <a:p>
+            <a:endParaRPr lang="en-IN" dirty="0"/>
+          </a:p>
+        </p:txBody>
+      </p:sp>
+    </p:spTree>
+    <p:extLst>
+      <p:ext uri="{BB962C8B-B14F-4D97-AF65-F5344CB8AC3E}">
+        <p14:creationId xmlns:p14="http://schemas.microsoft.com/office/powerpoint/2010/main" val="2849086474"/>
       </p:ext>
     </p:extLst>
   </p:cSld>

</xml_diff>